<commit_message>
dossier figures et ebauche intro
</commit_message>
<xml_diff>
--- a/soutenances/projet_decembre/intro.pptx
+++ b/soutenances/projet_decembre/intro.pptx
@@ -6,6 +6,7 @@
   </p:sldMasterIdLst>
   <p:sldIdLst>
     <p:sldId id="259" r:id="rId2"/>
+    <p:sldId id="260" r:id="rId3"/>
   </p:sldIdLst>
   <p:sldSz cx="9144000" cy="6858000" type="screen4x3"/>
   <p:notesSz cx="6858000" cy="9144000"/>
@@ -106,7 +107,7 @@
   </p:defaultTextStyle>
   <p:extLst>
     <p:ext uri="{521415D9-36F7-43E2-AB2F-B90AF26B5E84}">
-      <p14:sectionLst xmlns:p14="http://schemas.microsoft.com/office/powerpoint/2010/main" xmlns="">
+      <p14:sectionLst xmlns="" xmlns:p14="http://schemas.microsoft.com/office/powerpoint/2010/main">
         <p14:section name="Modèles INSA" id="{339B715A-A4F6-482F-9E8F-E995A152AF53}">
           <p14:sldIdLst>
             <p14:sldId id="256"/>
@@ -207,7 +208,7 @@
             <a:blip r:embed="rId2" cstate="print">
               <a:extLst>
                 <a:ext uri="{28A0092B-C50C-407E-A947-70E740481C1C}">
-                  <a14:useLocalDpi xmlns:a14="http://schemas.microsoft.com/office/drawing/2010/main" xmlns="" val="0"/>
+                  <a14:useLocalDpi xmlns="" xmlns:a14="http://schemas.microsoft.com/office/drawing/2010/main" val="0"/>
                 </a:ext>
               </a:extLst>
             </a:blip>
@@ -225,7 +226,7 @@
             <a:noFill/>
             <a:extLst>
               <a:ext uri="{909E8E84-426E-40DD-AFC4-6F175D3DCCD1}">
-                <a14:hiddenFill xmlns:a14="http://schemas.microsoft.com/office/drawing/2010/main" xmlns="">
+                <a14:hiddenFill xmlns="" xmlns:a14="http://schemas.microsoft.com/office/drawing/2010/main">
                   <a:solidFill>
                     <a:srgbClr val="FFFFFF"/>
                   </a:solidFill>
@@ -246,7 +247,7 @@
             <a:blip r:embed="rId3" cstate="print">
               <a:extLst>
                 <a:ext uri="{28A0092B-C50C-407E-A947-70E740481C1C}">
-                  <a14:useLocalDpi xmlns:a14="http://schemas.microsoft.com/office/drawing/2010/main" xmlns="" val="0"/>
+                  <a14:useLocalDpi xmlns="" xmlns:a14="http://schemas.microsoft.com/office/drawing/2010/main" val="0"/>
                 </a:ext>
               </a:extLst>
             </a:blip>
@@ -266,7 +267,7 @@
             <a:noFill/>
             <a:extLst>
               <a:ext uri="{909E8E84-426E-40DD-AFC4-6F175D3DCCD1}">
-                <a14:hiddenFill xmlns:a14="http://schemas.microsoft.com/office/drawing/2010/main" xmlns="">
+                <a14:hiddenFill xmlns="" xmlns:a14="http://schemas.microsoft.com/office/drawing/2010/main">
                   <a:solidFill>
                     <a:srgbClr val="FFFFFF"/>
                   </a:solidFill>
@@ -1315,7 +1316,7 @@
     </p:spTree>
     <p:extLst>
       <p:ext uri="{BB962C8B-B14F-4D97-AF65-F5344CB8AC3E}">
-        <p14:creationId xmlns:p14="http://schemas.microsoft.com/office/powerpoint/2010/main" xmlns="" val="2155599893"/>
+        <p14:creationId xmlns="" xmlns:p14="http://schemas.microsoft.com/office/powerpoint/2010/main" val="2155599893"/>
       </p:ext>
     </p:extLst>
   </p:cSld>
@@ -1473,7 +1474,7 @@
     </p:spTree>
     <p:extLst>
       <p:ext uri="{BB962C8B-B14F-4D97-AF65-F5344CB8AC3E}">
-        <p14:creationId xmlns:p14="http://schemas.microsoft.com/office/powerpoint/2010/main" xmlns="" val="2625538701"/>
+        <p14:creationId xmlns="" xmlns:p14="http://schemas.microsoft.com/office/powerpoint/2010/main" val="2625538701"/>
       </p:ext>
     </p:extLst>
   </p:cSld>
@@ -1701,7 +1702,7 @@
     </p:spTree>
     <p:extLst>
       <p:ext uri="{BB962C8B-B14F-4D97-AF65-F5344CB8AC3E}">
-        <p14:creationId xmlns:p14="http://schemas.microsoft.com/office/powerpoint/2010/main" xmlns="" val="1505370761"/>
+        <p14:creationId xmlns="" xmlns:p14="http://schemas.microsoft.com/office/powerpoint/2010/main" val="1505370761"/>
       </p:ext>
     </p:extLst>
   </p:cSld>
@@ -1947,7 +1948,7 @@
     </p:spTree>
     <p:extLst>
       <p:ext uri="{BB962C8B-B14F-4D97-AF65-F5344CB8AC3E}">
-        <p14:creationId xmlns:p14="http://schemas.microsoft.com/office/powerpoint/2010/main" xmlns="" val="1601618539"/>
+        <p14:creationId xmlns="" xmlns:p14="http://schemas.microsoft.com/office/powerpoint/2010/main" val="1601618539"/>
       </p:ext>
     </p:extLst>
   </p:cSld>
@@ -2331,7 +2332,7 @@
     </p:spTree>
     <p:extLst>
       <p:ext uri="{BB962C8B-B14F-4D97-AF65-F5344CB8AC3E}">
-        <p14:creationId xmlns:p14="http://schemas.microsoft.com/office/powerpoint/2010/main" xmlns="" val="171255179"/>
+        <p14:creationId xmlns="" xmlns:p14="http://schemas.microsoft.com/office/powerpoint/2010/main" val="171255179"/>
       </p:ext>
     </p:extLst>
   </p:cSld>
@@ -2433,7 +2434,7 @@
     </p:spTree>
     <p:extLst>
       <p:ext uri="{BB962C8B-B14F-4D97-AF65-F5344CB8AC3E}">
-        <p14:creationId xmlns:p14="http://schemas.microsoft.com/office/powerpoint/2010/main" xmlns="" val="4241946124"/>
+        <p14:creationId xmlns="" xmlns:p14="http://schemas.microsoft.com/office/powerpoint/2010/main" val="4241946124"/>
       </p:ext>
     </p:extLst>
   </p:cSld>
@@ -2471,7 +2472,7 @@
     </p:spTree>
     <p:extLst>
       <p:ext uri="{BB962C8B-B14F-4D97-AF65-F5344CB8AC3E}">
-        <p14:creationId xmlns:p14="http://schemas.microsoft.com/office/powerpoint/2010/main" xmlns="" val="3843733788"/>
+        <p14:creationId xmlns="" xmlns:p14="http://schemas.microsoft.com/office/powerpoint/2010/main" val="3843733788"/>
       </p:ext>
     </p:extLst>
   </p:cSld>
@@ -2767,7 +2768,7 @@
     </p:spTree>
     <p:extLst>
       <p:ext uri="{BB962C8B-B14F-4D97-AF65-F5344CB8AC3E}">
-        <p14:creationId xmlns:p14="http://schemas.microsoft.com/office/powerpoint/2010/main" xmlns="" val="680884878"/>
+        <p14:creationId xmlns="" xmlns:p14="http://schemas.microsoft.com/office/powerpoint/2010/main" val="680884878"/>
       </p:ext>
     </p:extLst>
   </p:cSld>
@@ -3816,7 +3817,7 @@
           <a:blip r:embed="rId10" cstate="print">
             <a:extLst>
               <a:ext uri="{28A0092B-C50C-407E-A947-70E740481C1C}">
-                <a14:useLocalDpi xmlns:a14="http://schemas.microsoft.com/office/drawing/2010/main" xmlns="" val="0"/>
+                <a14:useLocalDpi xmlns="" xmlns:a14="http://schemas.microsoft.com/office/drawing/2010/main" val="0"/>
               </a:ext>
             </a:extLst>
           </a:blip>
@@ -3834,7 +3835,7 @@
           <a:noFill/>
           <a:extLst>
             <a:ext uri="{909E8E84-426E-40DD-AFC4-6F175D3DCCD1}">
-              <a14:hiddenFill xmlns:a14="http://schemas.microsoft.com/office/drawing/2010/main" xmlns="">
+              <a14:hiddenFill xmlns="" xmlns:a14="http://schemas.microsoft.com/office/drawing/2010/main">
                 <a:solidFill>
                   <a:srgbClr val="FFFFFF"/>
                 </a:solidFill>
@@ -3855,7 +3856,7 @@
           <a:blip r:embed="rId11" cstate="print">
             <a:extLst>
               <a:ext uri="{28A0092B-C50C-407E-A947-70E740481C1C}">
-                <a14:useLocalDpi xmlns:a14="http://schemas.microsoft.com/office/drawing/2010/main" xmlns="" val="0"/>
+                <a14:useLocalDpi xmlns="" xmlns:a14="http://schemas.microsoft.com/office/drawing/2010/main" val="0"/>
               </a:ext>
             </a:extLst>
           </a:blip>
@@ -3875,7 +3876,7 @@
           <a:noFill/>
           <a:extLst>
             <a:ext uri="{909E8E84-426E-40DD-AFC4-6F175D3DCCD1}">
-              <a14:hiddenFill xmlns:a14="http://schemas.microsoft.com/office/drawing/2010/main" xmlns="">
+              <a14:hiddenFill xmlns="" xmlns:a14="http://schemas.microsoft.com/office/drawing/2010/main">
                 <a:solidFill>
                   <a:srgbClr val="FFFFFF"/>
                 </a:solidFill>
@@ -4033,7 +4034,7 @@
             <a:lum bright="70000" contrast="-70000"/>
             <a:extLst>
               <a:ext uri="{28A0092B-C50C-407E-A947-70E740481C1C}">
-                <a14:useLocalDpi xmlns:a14="http://schemas.microsoft.com/office/drawing/2010/main" xmlns="" val="0"/>
+                <a14:useLocalDpi xmlns="" xmlns:a14="http://schemas.microsoft.com/office/drawing/2010/main" val="0"/>
               </a:ext>
             </a:extLst>
           </a:blip>
@@ -4054,7 +4055,7 @@
     </p:spTree>
     <p:extLst>
       <p:ext uri="{BB962C8B-B14F-4D97-AF65-F5344CB8AC3E}">
-        <p14:creationId xmlns:p14="http://schemas.microsoft.com/office/powerpoint/2010/main" xmlns="" val="3080300347"/>
+        <p14:creationId xmlns="" xmlns:p14="http://schemas.microsoft.com/office/powerpoint/2010/main" val="3080300347"/>
       </p:ext>
     </p:extLst>
   </p:cSld>
@@ -4422,11 +4423,7 @@
           <a:p>
             <a:r>
               <a:rPr lang="fr-FR" smtClean="0"/>
-              <a:t>Etude de l’existant </a:t>
-            </a:r>
-            <a:r>
-              <a:rPr lang="fr-FR" smtClean="0"/>
-              <a:t> </a:t>
+              <a:t>Etude de l’existant  </a:t>
             </a:r>
             <a:r>
               <a:rPr lang="fr-FR" smtClean="0">
@@ -4442,11 +4439,7 @@
           <a:p>
             <a:r>
               <a:rPr lang="fr-FR" smtClean="0"/>
-              <a:t>Glasir : cahier des </a:t>
-            </a:r>
-            <a:r>
-              <a:rPr lang="fr-FR" smtClean="0"/>
-              <a:t>charges	</a:t>
+              <a:t>Glasir : cahier des charges	</a:t>
             </a:r>
             <a:r>
               <a:rPr lang="fr-FR" smtClean="0">
@@ -4532,6 +4525,128 @@
       </p:par>
     </p:tnLst>
   </p:timing>
+</p:sld>
+</file>
+
+<file path=ppt/slides/slide2.xml><?xml version="1.0" encoding="utf-8"?>
+<p:sld xmlns:a="http://schemas.openxmlformats.org/drawingml/2006/main" xmlns:r="http://schemas.openxmlformats.org/officeDocument/2006/relationships" xmlns:p="http://schemas.openxmlformats.org/presentationml/2006/main">
+  <p:cSld>
+    <p:spTree>
+      <p:nvGrpSpPr>
+        <p:cNvPr id="1" name=""/>
+        <p:cNvGrpSpPr/>
+        <p:nvPr/>
+      </p:nvGrpSpPr>
+      <p:grpSpPr>
+        <a:xfrm>
+          <a:off x="0" y="0"/>
+          <a:ext cx="0" cy="0"/>
+          <a:chOff x="0" y="0"/>
+          <a:chExt cx="0" cy="0"/>
+        </a:xfrm>
+      </p:grpSpPr>
+      <p:sp>
+        <p:nvSpPr>
+          <p:cNvPr id="2" name="Titre 1"/>
+          <p:cNvSpPr>
+            <a:spLocks noGrp="1"/>
+          </p:cNvSpPr>
+          <p:nvPr>
+            <p:ph type="title"/>
+          </p:nvPr>
+        </p:nvSpPr>
+        <p:spPr/>
+        <p:txBody>
+          <a:bodyPr/>
+          <a:lstStyle/>
+          <a:p>
+            <a:endParaRPr lang="fr-FR"/>
+          </a:p>
+        </p:txBody>
+      </p:sp>
+      <p:sp>
+        <p:nvSpPr>
+          <p:cNvPr id="3" name="Espace réservé du contenu 2"/>
+          <p:cNvSpPr>
+            <a:spLocks noGrp="1"/>
+          </p:cNvSpPr>
+          <p:nvPr>
+            <p:ph idx="1"/>
+          </p:nvPr>
+        </p:nvSpPr>
+        <p:spPr/>
+        <p:txBody>
+          <a:bodyPr>
+            <a:normAutofit/>
+          </a:bodyPr>
+          <a:lstStyle/>
+          <a:p>
+            <a:pPr algn="ctr"/>
+            <a:r>
+              <a:rPr lang="fr-FR" sz="4800" smtClean="0"/>
+              <a:t> </a:t>
+            </a:r>
+            <a:r>
+              <a:rPr lang="fr-FR" sz="4800" smtClean="0"/>
+              <a:t>16 et 18 mai 2012</a:t>
+            </a:r>
+          </a:p>
+          <a:p>
+            <a:pPr algn="ctr"/>
+            <a:endParaRPr lang="fr-FR" sz="4800" smtClean="0"/>
+          </a:p>
+          <a:p>
+            <a:pPr algn="ctr"/>
+            <a:endParaRPr lang="fr-FR" sz="4800" smtClean="0"/>
+          </a:p>
+          <a:p>
+            <a:pPr algn="ctr"/>
+            <a:endParaRPr lang="fr-FR" sz="4800" smtClean="0"/>
+          </a:p>
+          <a:p>
+            <a:pPr algn="ctr"/>
+            <a:r>
+              <a:rPr lang="fr-FR" sz="4800" smtClean="0"/>
+              <a:t>Le métro rennais paralysé</a:t>
+            </a:r>
+            <a:endParaRPr lang="fr-FR" sz="4800" smtClean="0"/>
+          </a:p>
+          <a:p>
+            <a:pPr algn="ctr"/>
+            <a:endParaRPr lang="fr-FR" sz="4800" smtClean="0"/>
+          </a:p>
+          <a:p>
+            <a:pPr algn="ctr"/>
+            <a:endParaRPr lang="fr-FR" sz="4800"/>
+          </a:p>
+        </p:txBody>
+      </p:sp>
+      <p:sp>
+        <p:nvSpPr>
+          <p:cNvPr id="4" name="Espace réservé du texte 3"/>
+          <p:cNvSpPr>
+            <a:spLocks noGrp="1"/>
+          </p:cNvSpPr>
+          <p:nvPr>
+            <p:ph type="body" sz="quarter" idx="10"/>
+          </p:nvPr>
+        </p:nvSpPr>
+        <p:spPr/>
+        <p:txBody>
+          <a:bodyPr>
+            <a:normAutofit fontScale="92500" lnSpcReduction="20000"/>
+          </a:bodyPr>
+          <a:lstStyle/>
+          <a:p>
+            <a:endParaRPr lang="fr-FR"/>
+          </a:p>
+        </p:txBody>
+      </p:sp>
+    </p:spTree>
+  </p:cSld>
+  <p:clrMapOvr>
+    <a:masterClrMapping/>
+  </p:clrMapOvr>
 </p:sld>
 </file>
 

</xml_diff>